<commit_message>
Updated articulations of Monti's frameworks for making community
</commit_message>
<xml_diff>
--- a/Reference/SOC5060_Framework_MontiCube.pptx
+++ b/Reference/SOC5060_Framework_MontiCube.pptx
@@ -241,7 +241,7 @@
           <a:p>
             <a:fld id="{40CF262A-BA9E-4FD4-B7A4-17D33C6E7493}" type="datetimeFigureOut">
               <a:rPr lang="en-US" smtClean="0"/>
-              <a:t>10/2/2019</a:t>
+              <a:t>10/3/2019</a:t>
             </a:fld>
             <a:endParaRPr lang="en-US"/>
           </a:p>
@@ -409,7 +409,7 @@
           <a:p>
             <a:fld id="{40CF262A-BA9E-4FD4-B7A4-17D33C6E7493}" type="datetimeFigureOut">
               <a:rPr lang="en-US" smtClean="0"/>
-              <a:t>10/2/2019</a:t>
+              <a:t>10/3/2019</a:t>
             </a:fld>
             <a:endParaRPr lang="en-US"/>
           </a:p>
@@ -587,7 +587,7 @@
           <a:p>
             <a:fld id="{40CF262A-BA9E-4FD4-B7A4-17D33C6E7493}" type="datetimeFigureOut">
               <a:rPr lang="en-US" smtClean="0"/>
-              <a:t>10/2/2019</a:t>
+              <a:t>10/3/2019</a:t>
             </a:fld>
             <a:endParaRPr lang="en-US"/>
           </a:p>
@@ -755,7 +755,7 @@
           <a:p>
             <a:fld id="{40CF262A-BA9E-4FD4-B7A4-17D33C6E7493}" type="datetimeFigureOut">
               <a:rPr lang="en-US" smtClean="0"/>
-              <a:t>10/2/2019</a:t>
+              <a:t>10/3/2019</a:t>
             </a:fld>
             <a:endParaRPr lang="en-US"/>
           </a:p>
@@ -1000,7 +1000,7 @@
           <a:p>
             <a:fld id="{40CF262A-BA9E-4FD4-B7A4-17D33C6E7493}" type="datetimeFigureOut">
               <a:rPr lang="en-US" smtClean="0"/>
-              <a:t>10/2/2019</a:t>
+              <a:t>10/3/2019</a:t>
             </a:fld>
             <a:endParaRPr lang="en-US"/>
           </a:p>
@@ -1229,7 +1229,7 @@
           <a:p>
             <a:fld id="{40CF262A-BA9E-4FD4-B7A4-17D33C6E7493}" type="datetimeFigureOut">
               <a:rPr lang="en-US" smtClean="0"/>
-              <a:t>10/2/2019</a:t>
+              <a:t>10/3/2019</a:t>
             </a:fld>
             <a:endParaRPr lang="en-US"/>
           </a:p>
@@ -1593,7 +1593,7 @@
           <a:p>
             <a:fld id="{40CF262A-BA9E-4FD4-B7A4-17D33C6E7493}" type="datetimeFigureOut">
               <a:rPr lang="en-US" smtClean="0"/>
-              <a:t>10/2/2019</a:t>
+              <a:t>10/3/2019</a:t>
             </a:fld>
             <a:endParaRPr lang="en-US"/>
           </a:p>
@@ -1710,7 +1710,7 @@
           <a:p>
             <a:fld id="{40CF262A-BA9E-4FD4-B7A4-17D33C6E7493}" type="datetimeFigureOut">
               <a:rPr lang="en-US" smtClean="0"/>
-              <a:t>10/2/2019</a:t>
+              <a:t>10/3/2019</a:t>
             </a:fld>
             <a:endParaRPr lang="en-US"/>
           </a:p>
@@ -1805,7 +1805,7 @@
           <a:p>
             <a:fld id="{40CF262A-BA9E-4FD4-B7A4-17D33C6E7493}" type="datetimeFigureOut">
               <a:rPr lang="en-US" smtClean="0"/>
-              <a:t>10/2/2019</a:t>
+              <a:t>10/3/2019</a:t>
             </a:fld>
             <a:endParaRPr lang="en-US"/>
           </a:p>
@@ -2080,7 +2080,7 @@
           <a:p>
             <a:fld id="{40CF262A-BA9E-4FD4-B7A4-17D33C6E7493}" type="datetimeFigureOut">
               <a:rPr lang="en-US" smtClean="0"/>
-              <a:t>10/2/2019</a:t>
+              <a:t>10/3/2019</a:t>
             </a:fld>
             <a:endParaRPr lang="en-US"/>
           </a:p>
@@ -2332,7 +2332,7 @@
           <a:p>
             <a:fld id="{40CF262A-BA9E-4FD4-B7A4-17D33C6E7493}" type="datetimeFigureOut">
               <a:rPr lang="en-US" smtClean="0"/>
-              <a:t>10/2/2019</a:t>
+              <a:t>10/3/2019</a:t>
             </a:fld>
             <a:endParaRPr lang="en-US"/>
           </a:p>
@@ -2543,7 +2543,7 @@
           <a:p>
             <a:fld id="{40CF262A-BA9E-4FD4-B7A4-17D33C6E7493}" type="datetimeFigureOut">
               <a:rPr lang="en-US" smtClean="0"/>
-              <a:t>10/2/2019</a:t>
+              <a:t>10/3/2019</a:t>
             </a:fld>
             <a:endParaRPr lang="en-US"/>
           </a:p>
@@ -3318,7 +3318,7 @@
           <p:nvPr/>
         </p:nvSpPr>
         <p:spPr>
-          <a:xfrm rot="3390128">
+          <a:xfrm rot="2239251">
             <a:off x="8605637" y="4614208"/>
             <a:ext cx="1371600" cy="379828"/>
           </a:xfrm>
@@ -3347,7 +3347,7 @@
           <p:nvPr/>
         </p:nvSpPr>
         <p:spPr>
-          <a:xfrm rot="3411797">
+          <a:xfrm rot="2300708">
             <a:off x="5947818" y="6130548"/>
             <a:ext cx="1371600" cy="379828"/>
           </a:xfrm>
@@ -3377,7 +3377,7 @@
         </p:nvSpPr>
         <p:spPr>
           <a:xfrm rot="1851826">
-            <a:off x="3508153" y="5335825"/>
+            <a:off x="3556201" y="5288868"/>
             <a:ext cx="1371600" cy="379828"/>
           </a:xfrm>
           <a:prstGeom prst="rect">
@@ -3407,7 +3407,7 @@
         </p:nvSpPr>
         <p:spPr>
           <a:xfrm rot="16200000">
-            <a:off x="9854935" y="2245470"/>
+            <a:off x="9723685" y="1983052"/>
             <a:ext cx="1828800" cy="379828"/>
           </a:xfrm>
           <a:prstGeom prst="rect">
@@ -3436,8 +3436,8 @@
           <p:nvPr/>
         </p:nvSpPr>
         <p:spPr>
-          <a:xfrm>
-            <a:off x="9116381" y="1324065"/>
+          <a:xfrm rot="19837610">
+            <a:off x="9206507" y="1138137"/>
             <a:ext cx="1645920" cy="646331"/>
           </a:xfrm>
           <a:prstGeom prst="rect">
@@ -3465,8 +3465,8 @@
           <p:nvPr/>
         </p:nvSpPr>
         <p:spPr>
-          <a:xfrm>
-            <a:off x="9125444" y="2643336"/>
+          <a:xfrm rot="19629406">
+            <a:off x="9215498" y="2594020"/>
             <a:ext cx="1645920" cy="646331"/>
           </a:xfrm>
           <a:prstGeom prst="rect">
@@ -3494,9 +3494,9 @@
           <p:nvPr/>
         </p:nvSpPr>
         <p:spPr>
-          <a:xfrm rot="18378846">
-            <a:off x="2256112" y="5368656"/>
-            <a:ext cx="1828800" cy="646331"/>
+          <a:xfrm rot="19594318">
+            <a:off x="1999971" y="5083615"/>
+            <a:ext cx="1828800" cy="923330"/>
           </a:xfrm>
           <a:prstGeom prst="rect">
             <a:avLst/>
@@ -3512,7 +3512,14 @@
             <a:pPr algn="r"/>
             <a:r>
               <a:rPr lang="en-US" dirty="0"/>
-              <a:t>Close Adherence Expected</a:t>
+              <a:t>Strict</a:t>
+            </a:r>
+            <a:br>
+              <a:rPr lang="en-US" dirty="0"/>
+            </a:br>
+            <a:r>
+              <a:rPr lang="en-US" dirty="0"/>
+              <a:t> Adherence Expected</a:t>
             </a:r>
           </a:p>
         </p:txBody>
@@ -3524,8 +3531,8 @@
           <p:nvPr/>
         </p:nvSpPr>
         <p:spPr>
-          <a:xfrm rot="17989190">
-            <a:off x="3777579" y="5973868"/>
+          <a:xfrm rot="19412875">
+            <a:off x="3646932" y="5912452"/>
             <a:ext cx="1645920" cy="923330"/>
           </a:xfrm>
           <a:prstGeom prst="rect">
@@ -3743,6 +3750,42 @@
           <a:xfrm flipV="1">
             <a:off x="5683348" y="1068430"/>
             <a:ext cx="0" cy="4994751"/>
+          </a:xfrm>
+          <a:prstGeom prst="straightConnector1">
+            <a:avLst/>
+          </a:prstGeom>
+          <a:ln w="25400">
+            <a:solidFill>
+              <a:schemeClr val="tx1"/>
+            </a:solidFill>
+            <a:tailEnd type="triangle" w="lg" len="med"/>
+          </a:ln>
+        </p:spPr>
+        <p:style>
+          <a:lnRef idx="1">
+            <a:schemeClr val="accent1"/>
+          </a:lnRef>
+          <a:fillRef idx="0">
+            <a:schemeClr val="accent1"/>
+          </a:fillRef>
+          <a:effectRef idx="0">
+            <a:schemeClr val="accent1"/>
+          </a:effectRef>
+          <a:fontRef idx="minor">
+            <a:schemeClr val="tx1"/>
+          </a:fontRef>
+        </p:style>
+      </p:cxnSp>
+      <p:cxnSp>
+        <p:nvCxnSpPr>
+          <p:cNvPr id="26" name="Straight Arrow Connector 25"/>
+          <p:cNvCxnSpPr/>
+          <p:nvPr/>
+        </p:nvCxnSpPr>
+        <p:spPr>
+          <a:xfrm flipV="1">
+            <a:off x="9216511" y="282257"/>
+            <a:ext cx="0" cy="3657600"/>
           </a:xfrm>
           <a:prstGeom prst="straightConnector1">
             <a:avLst/>

</xml_diff>